<commit_message>
Updated video0a, 9b for Clinical Research Methods
</commit_message>
<xml_diff>
--- a/clinical-research-methodology/results/video09a-validity.pptx
+++ b/clinical-research-methodology/results/video09a-validity.pptx
@@ -48304,15 +48304,7 @@
             </a:pPr>
             <a:r>
               <a:rPr/>
-              <a:t>Video</a:t>
-            </a:r>
-            <a:r>
-              <a:rPr/>
-              <a:t> </a:t>
-            </a:r>
-            <a:r>
-              <a:rPr/>
-              <a:t>9</a:t>
+              <a:t>Video09a</a:t>
             </a:r>
             <a:r>
               <a:rPr/>

</xml_diff>

<commit_message>
Merged video09a, 09b, and 09c
</commit_message>
<xml_diff>
--- a/clinical-research-methodology/results/video09a-validity.pptx
+++ b/clinical-research-methodology/results/video09a-validity.pptx
@@ -49595,7 +49595,7 @@
             <a:pPr lvl="1"/>
             <a:r>
               <a:rPr/>
-              <a:t>Brown-Spearman adjustement</a:t>
+              <a:t>Brown-Spearman adjustment</a:t>
             </a:r>
           </a:p>
         </p:txBody>
@@ -49685,6 +49685,115 @@
                   <a:rPr/>
                   <a:t>Only for composite measures with binary items</a:t>
                 </a:r>
+              </a:p>
+              <a:p>
+                <a:pPr lvl="1"/>
+                <a14:m>
+                  <m:oMath xmlns:m="http://schemas.openxmlformats.org/officeDocument/2006/math">
+                    <m:f>
+                      <m:fPr>
+                        <m:type m:val="bar"/>
+                      </m:fPr>
+                      <m:num>
+                        <m:r>
+                          <m:t>1</m:t>
+                        </m:r>
+                      </m:num>
+                      <m:den>
+                        <m:r>
+                          <m:t>I</m:t>
+                        </m:r>
+                        <m:r>
+                          <m:rPr>
+                            <m:sty m:val="p"/>
+                          </m:rPr>
+                          <m:t>−</m:t>
+                        </m:r>
+                        <m:r>
+                          <m:t>1</m:t>
+                        </m:r>
+                      </m:den>
+                    </m:f>
+                    <m:r>
+                      <m:rPr>
+                        <m:sty m:val="p"/>
+                      </m:rPr>
+                      <m:t>(</m:t>
+                    </m:r>
+                    <m:r>
+                      <m:t>1</m:t>
+                    </m:r>
+                    <m:r>
+                      <m:rPr>
+                        <m:sty m:val="p"/>
+                      </m:rPr>
+                      <m:t>−</m:t>
+                    </m:r>
+                    <m:f>
+                      <m:fPr>
+                        <m:type m:val="bar"/>
+                      </m:fPr>
+                      <m:num>
+                        <m:sSub>
+                          <m:e>
+                            <m:r>
+                              <m:t>Σ</m:t>
+                            </m:r>
+                          </m:e>
+                          <m:sub>
+                            <m:r>
+                              <m:t>i</m:t>
+                            </m:r>
+                          </m:sub>
+                        </m:sSub>
+                        <m:sSub>
+                          <m:e>
+                            <m:r>
+                              <m:t>p</m:t>
+                            </m:r>
+                          </m:e>
+                          <m:sub>
+                            <m:r>
+                              <m:t>i</m:t>
+                            </m:r>
+                          </m:sub>
+                        </m:sSub>
+                        <m:sSub>
+                          <m:e>
+                            <m:r>
+                              <m:t>q</m:t>
+                            </m:r>
+                          </m:e>
+                          <m:sub>
+                            <m:r>
+                              <m:t>i</m:t>
+                            </m:r>
+                          </m:sub>
+                        </m:sSub>
+                      </m:num>
+                      <m:den>
+                        <m:sSup>
+                          <m:e>
+                            <m:r>
+                              <m:t>S</m:t>
+                            </m:r>
+                          </m:e>
+                          <m:sup>
+                            <m:r>
+                              <m:t>2</m:t>
+                            </m:r>
+                          </m:sup>
+                        </m:sSup>
+                      </m:den>
+                    </m:f>
+                    <m:r>
+                      <m:rPr>
+                        <m:sty m:val="p"/>
+                      </m:rPr>
+                      <m:t>)</m:t>
+                    </m:r>
+                  </m:oMath>
+                </a14:m>
               </a:p>
               <a:p>
                 <a:pPr lvl="1"/>

</xml_diff>